<commit_message>
Añado muchos cambios desde el inicio del repositorio:
-Trabajo de Julio: Introducción, material y metodos y generación de resultados in situ antes de la reunion pre-agosto.

Se toma la decisión de ir a Febrero.

-Trabajo de primeras semanas de Septiembre: resultados in situ v3 con las mejoras propuestas que son ajusta el eje y hacer que el eje x aparezca la fecha exacta. Creadas rectas de regresión. Todo con R.

Estos resultados se han generado para el filtrado de R2 a 0,9 y a 0,95. En la proxima reunion veremos con que nos quedamos.
</commit_message>
<xml_diff>
--- a/Cajas de bigotes_v2.pptx
+++ b/Cajas de bigotes_v2.pptx
@@ -275,7 +275,7 @@
           <a:p>
             <a:fld id="{3D29C301-ABC1-4DD7-8629-5404497E062B}" type="datetimeFigureOut">
               <a:rPr lang="es-ES" smtClean="0"/>
-              <a:t>10/07/2023</a:t>
+              <a:t>11/07/2023</a:t>
             </a:fld>
             <a:endParaRPr lang="es-ES"/>
           </a:p>
@@ -473,7 +473,7 @@
           <a:p>
             <a:fld id="{3D29C301-ABC1-4DD7-8629-5404497E062B}" type="datetimeFigureOut">
               <a:rPr lang="es-ES" smtClean="0"/>
-              <a:t>10/07/2023</a:t>
+              <a:t>11/07/2023</a:t>
             </a:fld>
             <a:endParaRPr lang="es-ES"/>
           </a:p>
@@ -681,7 +681,7 @@
           <a:p>
             <a:fld id="{3D29C301-ABC1-4DD7-8629-5404497E062B}" type="datetimeFigureOut">
               <a:rPr lang="es-ES" smtClean="0"/>
-              <a:t>10/07/2023</a:t>
+              <a:t>11/07/2023</a:t>
             </a:fld>
             <a:endParaRPr lang="es-ES"/>
           </a:p>
@@ -879,7 +879,7 @@
           <a:p>
             <a:fld id="{3D29C301-ABC1-4DD7-8629-5404497E062B}" type="datetimeFigureOut">
               <a:rPr lang="es-ES" smtClean="0"/>
-              <a:t>10/07/2023</a:t>
+              <a:t>11/07/2023</a:t>
             </a:fld>
             <a:endParaRPr lang="es-ES"/>
           </a:p>
@@ -1154,7 +1154,7 @@
           <a:p>
             <a:fld id="{3D29C301-ABC1-4DD7-8629-5404497E062B}" type="datetimeFigureOut">
               <a:rPr lang="es-ES" smtClean="0"/>
-              <a:t>10/07/2023</a:t>
+              <a:t>11/07/2023</a:t>
             </a:fld>
             <a:endParaRPr lang="es-ES"/>
           </a:p>
@@ -1419,7 +1419,7 @@
           <a:p>
             <a:fld id="{3D29C301-ABC1-4DD7-8629-5404497E062B}" type="datetimeFigureOut">
               <a:rPr lang="es-ES" smtClean="0"/>
-              <a:t>10/07/2023</a:t>
+              <a:t>11/07/2023</a:t>
             </a:fld>
             <a:endParaRPr lang="es-ES"/>
           </a:p>
@@ -1831,7 +1831,7 @@
           <a:p>
             <a:fld id="{3D29C301-ABC1-4DD7-8629-5404497E062B}" type="datetimeFigureOut">
               <a:rPr lang="es-ES" smtClean="0"/>
-              <a:t>10/07/2023</a:t>
+              <a:t>11/07/2023</a:t>
             </a:fld>
             <a:endParaRPr lang="es-ES"/>
           </a:p>
@@ -1972,7 +1972,7 @@
           <a:p>
             <a:fld id="{3D29C301-ABC1-4DD7-8629-5404497E062B}" type="datetimeFigureOut">
               <a:rPr lang="es-ES" smtClean="0"/>
-              <a:t>10/07/2023</a:t>
+              <a:t>11/07/2023</a:t>
             </a:fld>
             <a:endParaRPr lang="es-ES"/>
           </a:p>
@@ -2085,7 +2085,7 @@
           <a:p>
             <a:fld id="{3D29C301-ABC1-4DD7-8629-5404497E062B}" type="datetimeFigureOut">
               <a:rPr lang="es-ES" smtClean="0"/>
-              <a:t>10/07/2023</a:t>
+              <a:t>11/07/2023</a:t>
             </a:fld>
             <a:endParaRPr lang="es-ES"/>
           </a:p>
@@ -2396,7 +2396,7 @@
           <a:p>
             <a:fld id="{3D29C301-ABC1-4DD7-8629-5404497E062B}" type="datetimeFigureOut">
               <a:rPr lang="es-ES" smtClean="0"/>
-              <a:t>10/07/2023</a:t>
+              <a:t>11/07/2023</a:t>
             </a:fld>
             <a:endParaRPr lang="es-ES"/>
           </a:p>
@@ -2684,7 +2684,7 @@
           <a:p>
             <a:fld id="{3D29C301-ABC1-4DD7-8629-5404497E062B}" type="datetimeFigureOut">
               <a:rPr lang="es-ES" smtClean="0"/>
-              <a:t>10/07/2023</a:t>
+              <a:t>11/07/2023</a:t>
             </a:fld>
             <a:endParaRPr lang="es-ES"/>
           </a:p>
@@ -2925,7 +2925,7 @@
           <a:p>
             <a:fld id="{3D29C301-ABC1-4DD7-8629-5404497E062B}" type="datetimeFigureOut">
               <a:rPr lang="es-ES" smtClean="0"/>
-              <a:t>10/07/2023</a:t>
+              <a:t>11/07/2023</a:t>
             </a:fld>
             <a:endParaRPr lang="es-ES"/>
           </a:p>
@@ -4007,10 +4007,15 @@
           </p:nvPr>
         </p:nvPicPr>
         <p:blipFill>
-          <a:blip r:embed="rId2"/>
-          <a:stretch>
-            <a:fillRect/>
-          </a:stretch>
+          <a:blip r:embed="rId2">
+            <a:extLst>
+              <a:ext uri="{28A0092B-C50C-407E-A947-70E740481C1C}">
+                <a14:useLocalDpi xmlns:a14="http://schemas.microsoft.com/office/drawing/2010/main" val="0"/>
+              </a:ext>
+            </a:extLst>
+          </a:blip>
+          <a:srcRect/>
+          <a:stretch/>
         </p:blipFill>
         <p:spPr>
           <a:xfrm>
@@ -4225,31 +4230,6 @@
           </a:p>
         </p:txBody>
       </p:sp>
-      <p:sp>
-        <p:nvSpPr>
-          <p:cNvPr id="3" name="Marcador de contenido 2">
-            <a:extLst>
-              <a:ext uri="{FF2B5EF4-FFF2-40B4-BE49-F238E27FC236}">
-                <a16:creationId xmlns:a16="http://schemas.microsoft.com/office/drawing/2014/main" id="{3EB29577-1A02-D1FD-63B6-D870749C4254}"/>
-              </a:ext>
-            </a:extLst>
-          </p:cNvPr>
-          <p:cNvSpPr>
-            <a:spLocks noGrp="1"/>
-          </p:cNvSpPr>
-          <p:nvPr>
-            <p:ph idx="1"/>
-          </p:nvPr>
-        </p:nvSpPr>
-        <p:spPr/>
-        <p:txBody>
-          <a:bodyPr/>
-          <a:lstStyle/>
-          <a:p>
-            <a:endParaRPr lang="es-ES"/>
-          </a:p>
-        </p:txBody>
-      </p:sp>
       <p:pic>
         <p:nvPicPr>
           <p:cNvPr id="6" name="Marcador de contenido 3">
@@ -4278,7 +4258,7 @@
         <p:spPr>
           <a:xfrm>
             <a:off x="1388245" y="1766778"/>
-            <a:ext cx="9415509" cy="4908815"/>
+            <a:ext cx="9415509" cy="4908814"/>
           </a:xfrm>
           <a:prstGeom prst="rect">
             <a:avLst/>

</xml_diff>